<commit_message>
Edited the diagrams used and description of Implementation of Calendar and event management.
</commit_message>
<xml_diff>
--- a/docs/diagrams/AddEventSD.pptx
+++ b/docs/diagrams/AddEventSD.pptx
@@ -3997,9 +3997,9 @@
           <p:nvPr/>
         </p:nvCxnSpPr>
         <p:spPr>
-          <a:xfrm flipV="1">
-            <a:off x="1799555" y="2957652"/>
-            <a:ext cx="1951143" cy="17692"/>
+          <a:xfrm>
+            <a:off x="1801609" y="2957651"/>
+            <a:ext cx="1889413" cy="1"/>
           </a:xfrm>
           <a:prstGeom prst="straightConnector1">
             <a:avLst/>
@@ -4633,7 +4633,7 @@
         </p:nvSpPr>
         <p:spPr>
           <a:xfrm>
-            <a:off x="3962672" y="2731313"/>
+            <a:off x="3964187" y="2823343"/>
             <a:ext cx="780823" cy="184666"/>
           </a:xfrm>
           <a:prstGeom prst="rect">

</xml_diff>